<commit_message>
Added Premature Stop slide
</commit_message>
<xml_diff>
--- a/Presentation 1.3.pptx
+++ b/Presentation 1.3.pptx
@@ -31,6 +31,7 @@
     <p:sldId id="276" r:id="rId26"/>
     <p:sldId id="277" r:id="rId27"/>
     <p:sldId id="278" r:id="rId28"/>
+    <p:sldId id="279" r:id="rId29"/>
   </p:sldIdLst>
   <p:sldSz cy="5143500" cx="9144000"/>
   <p:notesSz cx="6858000" cy="9144000"/>
@@ -1058,7 +1059,7 @@
   <p:cSld>
     <p:spTree>
       <p:nvGrpSpPr>
-        <p:cNvPr id="164" name="Shape 164"/>
+        <p:cNvPr id="162" name="Shape 162"/>
         <p:cNvGrpSpPr/>
         <p:nvPr/>
       </p:nvGrpSpPr>
@@ -1072,7 +1073,7 @@
       </p:grpSpPr>
       <p:sp>
         <p:nvSpPr>
-          <p:cNvPr id="165" name="Shape 165"/>
+          <p:cNvPr id="163" name="Shape 163"/>
           <p:cNvSpPr/>
           <p:nvPr>
             <p:ph idx="2" type="sldImg"/>
@@ -1106,7 +1107,7 @@
       </p:sp>
       <p:sp>
         <p:nvSpPr>
-          <p:cNvPr id="166" name="Shape 166"/>
+          <p:cNvPr id="164" name="Shape 164"/>
           <p:cNvSpPr txBox="1"/>
           <p:nvPr>
             <p:ph idx="1" type="body"/>
@@ -1153,7 +1154,7 @@
   <p:cSld>
     <p:spTree>
       <p:nvGrpSpPr>
-        <p:cNvPr id="172" name="Shape 172"/>
+        <p:cNvPr id="170" name="Shape 170"/>
         <p:cNvGrpSpPr/>
         <p:nvPr/>
       </p:nvGrpSpPr>
@@ -1167,7 +1168,7 @@
       </p:grpSpPr>
       <p:sp>
         <p:nvSpPr>
-          <p:cNvPr id="173" name="Shape 173"/>
+          <p:cNvPr id="171" name="Shape 171"/>
           <p:cNvSpPr/>
           <p:nvPr>
             <p:ph idx="2" type="sldImg"/>
@@ -1201,7 +1202,7 @@
       </p:sp>
       <p:sp>
         <p:nvSpPr>
-          <p:cNvPr id="174" name="Shape 174"/>
+          <p:cNvPr id="172" name="Shape 172"/>
           <p:cNvSpPr txBox="1"/>
           <p:nvPr>
             <p:ph idx="1" type="body"/>
@@ -1248,7 +1249,7 @@
   <p:cSld>
     <p:spTree>
       <p:nvGrpSpPr>
-        <p:cNvPr id="180" name="Shape 180"/>
+        <p:cNvPr id="178" name="Shape 178"/>
         <p:cNvGrpSpPr/>
         <p:nvPr/>
       </p:nvGrpSpPr>
@@ -1262,7 +1263,7 @@
       </p:grpSpPr>
       <p:sp>
         <p:nvSpPr>
-          <p:cNvPr id="181" name="Shape 181"/>
+          <p:cNvPr id="179" name="Shape 179"/>
           <p:cNvSpPr/>
           <p:nvPr>
             <p:ph idx="2" type="sldImg"/>
@@ -1296,7 +1297,7 @@
       </p:sp>
       <p:sp>
         <p:nvSpPr>
-          <p:cNvPr id="182" name="Shape 182"/>
+          <p:cNvPr id="180" name="Shape 180"/>
           <p:cNvSpPr txBox="1"/>
           <p:nvPr>
             <p:ph idx="1" type="body"/>
@@ -1343,7 +1344,7 @@
   <p:cSld>
     <p:spTree>
       <p:nvGrpSpPr>
-        <p:cNvPr id="189" name="Shape 189"/>
+        <p:cNvPr id="186" name="Shape 186"/>
         <p:cNvGrpSpPr/>
         <p:nvPr/>
       </p:nvGrpSpPr>
@@ -1357,7 +1358,7 @@
       </p:grpSpPr>
       <p:sp>
         <p:nvSpPr>
-          <p:cNvPr id="190" name="Shape 190"/>
+          <p:cNvPr id="187" name="Shape 187"/>
           <p:cNvSpPr/>
           <p:nvPr>
             <p:ph idx="2" type="sldImg"/>
@@ -1391,7 +1392,7 @@
       </p:sp>
       <p:sp>
         <p:nvSpPr>
-          <p:cNvPr id="191" name="Shape 191"/>
+          <p:cNvPr id="188" name="Shape 188"/>
           <p:cNvSpPr txBox="1"/>
           <p:nvPr>
             <p:ph idx="1" type="body"/>
@@ -1559,7 +1560,7 @@
   <p:cSld>
     <p:spTree>
       <p:nvGrpSpPr>
-        <p:cNvPr id="196" name="Shape 196"/>
+        <p:cNvPr id="195" name="Shape 195"/>
         <p:cNvGrpSpPr/>
         <p:nvPr/>
       </p:nvGrpSpPr>
@@ -1573,7 +1574,7 @@
       </p:grpSpPr>
       <p:sp>
         <p:nvSpPr>
-          <p:cNvPr id="197" name="Shape 197"/>
+          <p:cNvPr id="196" name="Shape 196"/>
           <p:cNvSpPr/>
           <p:nvPr>
             <p:ph idx="2" type="sldImg"/>
@@ -1607,7 +1608,7 @@
       </p:sp>
       <p:sp>
         <p:nvSpPr>
-          <p:cNvPr id="198" name="Shape 198"/>
+          <p:cNvPr id="197" name="Shape 197"/>
           <p:cNvSpPr txBox="1"/>
           <p:nvPr>
             <p:ph idx="1" type="body"/>
@@ -1654,7 +1655,7 @@
   <p:cSld>
     <p:spTree>
       <p:nvGrpSpPr>
-        <p:cNvPr id="204" name="Shape 204"/>
+        <p:cNvPr id="202" name="Shape 202"/>
         <p:cNvGrpSpPr/>
         <p:nvPr/>
       </p:nvGrpSpPr>
@@ -1668,7 +1669,7 @@
       </p:grpSpPr>
       <p:sp>
         <p:nvSpPr>
-          <p:cNvPr id="205" name="Shape 205"/>
+          <p:cNvPr id="203" name="Shape 203"/>
           <p:cNvSpPr/>
           <p:nvPr>
             <p:ph idx="2" type="sldImg"/>
@@ -1702,7 +1703,7 @@
       </p:sp>
       <p:sp>
         <p:nvSpPr>
-          <p:cNvPr id="206" name="Shape 206"/>
+          <p:cNvPr id="204" name="Shape 204"/>
           <p:cNvSpPr txBox="1"/>
           <p:nvPr>
             <p:ph idx="1" type="body"/>
@@ -1749,7 +1750,7 @@
   <p:cSld>
     <p:spTree>
       <p:nvGrpSpPr>
-        <p:cNvPr id="211" name="Shape 211"/>
+        <p:cNvPr id="210" name="Shape 210"/>
         <p:cNvGrpSpPr/>
         <p:nvPr/>
       </p:nvGrpSpPr>
@@ -1763,7 +1764,7 @@
       </p:grpSpPr>
       <p:sp>
         <p:nvSpPr>
-          <p:cNvPr id="212" name="Shape 212"/>
+          <p:cNvPr id="211" name="Shape 211"/>
           <p:cNvSpPr/>
           <p:nvPr>
             <p:ph idx="2" type="sldImg"/>
@@ -1797,7 +1798,7 @@
       </p:sp>
       <p:sp>
         <p:nvSpPr>
-          <p:cNvPr id="213" name="Shape 213"/>
+          <p:cNvPr id="212" name="Shape 212"/>
           <p:cNvSpPr txBox="1"/>
           <p:nvPr>
             <p:ph idx="1" type="body"/>
@@ -1844,7 +1845,7 @@
   <p:cSld>
     <p:spTree>
       <p:nvGrpSpPr>
-        <p:cNvPr id="221" name="Shape 221"/>
+        <p:cNvPr id="217" name="Shape 217"/>
         <p:cNvGrpSpPr/>
         <p:nvPr/>
       </p:nvGrpSpPr>
@@ -1858,7 +1859,7 @@
       </p:grpSpPr>
       <p:sp>
         <p:nvSpPr>
-          <p:cNvPr id="222" name="Shape 222"/>
+          <p:cNvPr id="218" name="Shape 218"/>
           <p:cNvSpPr/>
           <p:nvPr>
             <p:ph idx="2" type="sldImg"/>
@@ -1892,7 +1893,102 @@
       </p:sp>
       <p:sp>
         <p:nvSpPr>
-          <p:cNvPr id="223" name="Shape 223"/>
+          <p:cNvPr id="219" name="Shape 219"/>
+          <p:cNvSpPr txBox="1"/>
+          <p:nvPr>
+            <p:ph idx="1" type="body"/>
+          </p:nvPr>
+        </p:nvSpPr>
+        <p:spPr>
+          <a:xfrm>
+            <a:off x="685800" y="4343400"/>
+            <a:ext cx="5486400" cy="4114800"/>
+          </a:xfrm>
+          <a:prstGeom prst="rect">
+            <a:avLst/>
+          </a:prstGeom>
+        </p:spPr>
+        <p:txBody>
+          <a:bodyPr anchorCtr="0" anchor="t" bIns="91425" lIns="91425" rIns="91425" tIns="91425">
+            <a:noAutofit/>
+          </a:bodyPr>
+          <a:lstStyle/>
+          <a:p>
+            <a:pPr lvl="0">
+              <a:spcBef>
+                <a:spcPts val="0"/>
+              </a:spcBef>
+              <a:buNone/>
+            </a:pPr>
+            <a:r>
+              <a:t/>
+            </a:r>
+            <a:endParaRPr/>
+          </a:p>
+        </p:txBody>
+      </p:sp>
+    </p:spTree>
+  </p:cSld>
+  <p:clrMapOvr>
+    <a:masterClrMapping/>
+  </p:clrMapOvr>
+</p:notes>
+</file>
+
+<file path=ppt/notesSlides/notesSlide24.xml><?xml version="1.0" encoding="utf-8"?>
+<p:notes xmlns:a="http://schemas.openxmlformats.org/drawingml/2006/main" xmlns:r="http://schemas.openxmlformats.org/officeDocument/2006/relationships" xmlns:mc="http://schemas.openxmlformats.org/markup-compatibility/2006" xmlns:mv="urn:schemas-microsoft-com:mac:vml" xmlns:p="http://schemas.openxmlformats.org/presentationml/2006/main" xmlns:c="http://schemas.openxmlformats.org/drawingml/2006/chart" xmlns:dgm="http://schemas.openxmlformats.org/drawingml/2006/diagram" xmlns:o="urn:schemas-microsoft-com:office:office" xmlns:v="urn:schemas-microsoft-com:vml" xmlns:pvml="urn:schemas-microsoft-com:office:powerpoint" xmlns:com="http://schemas.openxmlformats.org/drawingml/2006/compatibility" xmlns:p14="http://schemas.microsoft.com/office/powerpoint/2010/main" showMasterPhAnim="0" showMasterSp="0">
+  <p:cSld>
+    <p:spTree>
+      <p:nvGrpSpPr>
+        <p:cNvPr id="227" name="Shape 227"/>
+        <p:cNvGrpSpPr/>
+        <p:nvPr/>
+      </p:nvGrpSpPr>
+      <p:grpSpPr>
+        <a:xfrm>
+          <a:off x="0" y="0"/>
+          <a:ext cx="0" cy="0"/>
+          <a:chOff x="0" y="0"/>
+          <a:chExt cx="0" cy="0"/>
+        </a:xfrm>
+      </p:grpSpPr>
+      <p:sp>
+        <p:nvSpPr>
+          <p:cNvPr id="228" name="Shape 228"/>
+          <p:cNvSpPr/>
+          <p:nvPr>
+            <p:ph idx="2" type="sldImg"/>
+          </p:nvPr>
+        </p:nvSpPr>
+        <p:spPr>
+          <a:xfrm>
+            <a:off x="381300" y="685800"/>
+            <a:ext cx="6096000" cy="3429000"/>
+          </a:xfrm>
+          <a:custGeom>
+            <a:pathLst>
+              <a:path extrusionOk="0" h="120000" w="120000">
+                <a:moveTo>
+                  <a:pt x="0" y="0"/>
+                </a:moveTo>
+                <a:lnTo>
+                  <a:pt x="120000" y="0"/>
+                </a:lnTo>
+                <a:lnTo>
+                  <a:pt x="120000" y="120000"/>
+                </a:lnTo>
+                <a:lnTo>
+                  <a:pt x="0" y="120000"/>
+                </a:lnTo>
+                <a:close/>
+              </a:path>
+            </a:pathLst>
+          </a:custGeom>
+        </p:spPr>
+      </p:sp>
+      <p:sp>
+        <p:nvSpPr>
+          <p:cNvPr id="229" name="Shape 229"/>
           <p:cNvSpPr txBox="1"/>
           <p:nvPr>
             <p:ph idx="1" type="body"/>
@@ -6687,7 +6783,7 @@
             </a:pPr>
             <a:r>
               <a:rPr lang="en"/>
-              <a:t>PolyPhen</a:t>
+              <a:t>Premature Stop</a:t>
             </a:r>
           </a:p>
         </p:txBody>
@@ -6715,75 +6811,51 @@
           </a:bodyPr>
           <a:lstStyle/>
           <a:p>
-            <a:pPr lvl="0">
-              <a:spcBef>
-                <a:spcPts val="0"/>
-              </a:spcBef>
-              <a:buNone/>
+            <a:pPr indent="-228600" lvl="0" marL="457200" rtl="0">
+              <a:spcBef>
+                <a:spcPts val="0"/>
+              </a:spcBef>
             </a:pPr>
             <a:r>
-              <a:t/>
+              <a:rPr lang="en"/>
+              <a:t>3 missing nonsense mutations</a:t>
             </a:r>
-            <a:endParaRPr/>
+          </a:p>
+          <a:p>
+            <a:pPr indent="-228600" lvl="0" marL="457200" rtl="0">
+              <a:spcBef>
+                <a:spcPts val="0"/>
+              </a:spcBef>
+            </a:pPr>
+            <a:r>
+              <a:rPr lang="en"/>
+              <a:t>Length: </a:t>
+            </a:r>
+          </a:p>
+          <a:p>
+            <a:pPr indent="-228600" lvl="1" marL="914400" rtl="0">
+              <a:spcBef>
+                <a:spcPts val="0"/>
+              </a:spcBef>
+            </a:pPr>
+            <a:r>
+              <a:rPr lang="en"/>
+              <a:t>1x15</a:t>
+            </a:r>
+          </a:p>
+          <a:p>
+            <a:pPr indent="-228600" lvl="1" marL="914400">
+              <a:spcBef>
+                <a:spcPts val="0"/>
+              </a:spcBef>
+            </a:pPr>
+            <a:r>
+              <a:rPr lang="en"/>
+              <a:t>2X101</a:t>
+            </a:r>
           </a:p>
         </p:txBody>
       </p:sp>
-      <p:pic>
-        <p:nvPicPr>
-          <p:cNvPr id="162" name="Shape 162"/>
-          <p:cNvPicPr preferRelativeResize="0"/>
-          <p:nvPr/>
-        </p:nvPicPr>
-        <p:blipFill>
-          <a:blip r:embed="rId3">
-            <a:alphaModFix/>
-          </a:blip>
-          <a:stretch>
-            <a:fillRect/>
-          </a:stretch>
-        </p:blipFill>
-        <p:spPr>
-          <a:xfrm>
-            <a:off x="1371600" y="1337537"/>
-            <a:ext cx="6400800" cy="3171825"/>
-          </a:xfrm>
-          <a:prstGeom prst="rect">
-            <a:avLst/>
-          </a:prstGeom>
-          <a:noFill/>
-          <a:ln>
-            <a:noFill/>
-          </a:ln>
-        </p:spPr>
-      </p:pic>
-      <p:pic>
-        <p:nvPicPr>
-          <p:cNvPr id="163" name="Shape 163"/>
-          <p:cNvPicPr preferRelativeResize="0"/>
-          <p:nvPr/>
-        </p:nvPicPr>
-        <p:blipFill>
-          <a:blip r:embed="rId4">
-            <a:alphaModFix/>
-          </a:blip>
-          <a:stretch>
-            <a:fillRect/>
-          </a:stretch>
-        </p:blipFill>
-        <p:spPr>
-          <a:xfrm>
-            <a:off x="7276850" y="4703625"/>
-            <a:ext cx="1555462" cy="269825"/>
-          </a:xfrm>
-          <a:prstGeom prst="rect">
-            <a:avLst/>
-          </a:prstGeom>
-          <a:noFill/>
-          <a:ln>
-            <a:noFill/>
-          </a:ln>
-        </p:spPr>
-      </p:pic>
     </p:spTree>
   </p:cSld>
   <p:clrMapOvr>
@@ -6797,7 +6869,7 @@
   <p:cSld>
     <p:spTree>
       <p:nvGrpSpPr>
-        <p:cNvPr id="167" name="Shape 167"/>
+        <p:cNvPr id="165" name="Shape 165"/>
         <p:cNvGrpSpPr/>
         <p:nvPr/>
       </p:nvGrpSpPr>
@@ -6811,7 +6883,7 @@
       </p:grpSpPr>
       <p:sp>
         <p:nvSpPr>
-          <p:cNvPr id="168" name="Shape 168"/>
+          <p:cNvPr id="166" name="Shape 166"/>
           <p:cNvSpPr txBox="1"/>
           <p:nvPr>
             <p:ph type="title"/>
@@ -6840,14 +6912,14 @@
             </a:pPr>
             <a:r>
               <a:rPr lang="en"/>
-              <a:t>PROVEAN</a:t>
+              <a:t>PolyPhen</a:t>
             </a:r>
           </a:p>
         </p:txBody>
       </p:sp>
       <p:sp>
         <p:nvSpPr>
-          <p:cNvPr id="169" name="Shape 169"/>
+          <p:cNvPr id="167" name="Shape 167"/>
           <p:cNvSpPr txBox="1"/>
           <p:nvPr>
             <p:ph idx="1" type="body"/>
@@ -6883,7 +6955,7 @@
       </p:sp>
       <p:pic>
         <p:nvPicPr>
-          <p:cNvPr id="170" name="Shape 170"/>
+          <p:cNvPr id="168" name="Shape 168"/>
           <p:cNvPicPr preferRelativeResize="0"/>
           <p:nvPr/>
         </p:nvPicPr>
@@ -6897,8 +6969,8 @@
         </p:blipFill>
         <p:spPr>
           <a:xfrm>
-            <a:off x="619125" y="1223962"/>
-            <a:ext cx="7905750" cy="2695575"/>
+            <a:off x="1371600" y="1337537"/>
+            <a:ext cx="6400800" cy="3171825"/>
           </a:xfrm>
           <a:prstGeom prst="rect">
             <a:avLst/>
@@ -6911,7 +6983,7 @@
       </p:pic>
       <p:pic>
         <p:nvPicPr>
-          <p:cNvPr id="171" name="Shape 171"/>
+          <p:cNvPr id="169" name="Shape 169"/>
           <p:cNvPicPr preferRelativeResize="0"/>
           <p:nvPr/>
         </p:nvPicPr>
@@ -6925,8 +6997,8 @@
         </p:blipFill>
         <p:spPr>
           <a:xfrm>
-            <a:off x="6779525" y="4703625"/>
-            <a:ext cx="2052786" cy="269825"/>
+            <a:off x="7276850" y="4703625"/>
+            <a:ext cx="1555462" cy="269825"/>
           </a:xfrm>
           <a:prstGeom prst="rect">
             <a:avLst/>
@@ -6950,7 +7022,7 @@
   <p:cSld>
     <p:spTree>
       <p:nvGrpSpPr>
-        <p:cNvPr id="175" name="Shape 175"/>
+        <p:cNvPr id="173" name="Shape 173"/>
         <p:cNvGrpSpPr/>
         <p:nvPr/>
       </p:nvGrpSpPr>
@@ -6964,7 +7036,7 @@
       </p:grpSpPr>
       <p:sp>
         <p:nvSpPr>
-          <p:cNvPr id="176" name="Shape 176"/>
+          <p:cNvPr id="174" name="Shape 174"/>
           <p:cNvSpPr txBox="1"/>
           <p:nvPr>
             <p:ph type="title"/>
@@ -6993,14 +7065,14 @@
             </a:pPr>
             <a:r>
               <a:rPr lang="en"/>
-              <a:t>SIFT</a:t>
+              <a:t>PROVEAN</a:t>
             </a:r>
           </a:p>
         </p:txBody>
       </p:sp>
       <p:sp>
         <p:nvSpPr>
-          <p:cNvPr id="177" name="Shape 177"/>
+          <p:cNvPr id="175" name="Shape 175"/>
           <p:cNvSpPr txBox="1"/>
           <p:nvPr>
             <p:ph idx="1" type="body"/>
@@ -7036,7 +7108,7 @@
       </p:sp>
       <p:pic>
         <p:nvPicPr>
-          <p:cNvPr id="178" name="Shape 178"/>
+          <p:cNvPr id="176" name="Shape 176"/>
           <p:cNvPicPr preferRelativeResize="0"/>
           <p:nvPr/>
         </p:nvPicPr>
@@ -7050,8 +7122,8 @@
         </p:blipFill>
         <p:spPr>
           <a:xfrm>
-            <a:off x="2566625" y="1152475"/>
-            <a:ext cx="3280275" cy="3710000"/>
+            <a:off x="619125" y="1223962"/>
+            <a:ext cx="7905750" cy="2695575"/>
           </a:xfrm>
           <a:prstGeom prst="rect">
             <a:avLst/>
@@ -7064,7 +7136,7 @@
       </p:pic>
       <p:pic>
         <p:nvPicPr>
-          <p:cNvPr id="179" name="Shape 179"/>
+          <p:cNvPr id="177" name="Shape 177"/>
           <p:cNvPicPr preferRelativeResize="0"/>
           <p:nvPr/>
         </p:nvPicPr>
@@ -7078,8 +7150,8 @@
         </p:blipFill>
         <p:spPr>
           <a:xfrm>
-            <a:off x="7483175" y="4703625"/>
-            <a:ext cx="1349125" cy="269825"/>
+            <a:off x="6779525" y="4703625"/>
+            <a:ext cx="2052786" cy="269825"/>
           </a:xfrm>
           <a:prstGeom prst="rect">
             <a:avLst/>
@@ -7103,7 +7175,7 @@
   <p:cSld>
     <p:spTree>
       <p:nvGrpSpPr>
-        <p:cNvPr id="183" name="Shape 183"/>
+        <p:cNvPr id="181" name="Shape 181"/>
         <p:cNvGrpSpPr/>
         <p:nvPr/>
       </p:nvGrpSpPr>
@@ -7117,7 +7189,7 @@
       </p:grpSpPr>
       <p:sp>
         <p:nvSpPr>
-          <p:cNvPr id="184" name="Shape 184"/>
+          <p:cNvPr id="182" name="Shape 182"/>
           <p:cNvSpPr txBox="1"/>
           <p:nvPr>
             <p:ph type="title"/>
@@ -7146,14 +7218,14 @@
             </a:pPr>
             <a:r>
               <a:rPr lang="en"/>
-              <a:t>PolyPhen2</a:t>
+              <a:t>SIFT</a:t>
             </a:r>
           </a:p>
         </p:txBody>
       </p:sp>
       <p:sp>
         <p:nvSpPr>
-          <p:cNvPr id="185" name="Shape 185"/>
+          <p:cNvPr id="183" name="Shape 183"/>
           <p:cNvSpPr txBox="1"/>
           <p:nvPr>
             <p:ph idx="1" type="body"/>
@@ -7189,7 +7261,7 @@
       </p:sp>
       <p:pic>
         <p:nvPicPr>
-          <p:cNvPr id="186" name="Shape 186"/>
+          <p:cNvPr id="184" name="Shape 184"/>
           <p:cNvPicPr preferRelativeResize="0"/>
           <p:nvPr/>
         </p:nvPicPr>
@@ -7203,8 +7275,8 @@
         </p:blipFill>
         <p:spPr>
           <a:xfrm>
-            <a:off x="1763600" y="1171124"/>
-            <a:ext cx="5431450" cy="2801249"/>
+            <a:off x="2566625" y="1152475"/>
+            <a:ext cx="3280275" cy="3710000"/>
           </a:xfrm>
           <a:prstGeom prst="rect">
             <a:avLst/>
@@ -7217,7 +7289,7 @@
       </p:pic>
       <p:pic>
         <p:nvPicPr>
-          <p:cNvPr id="187" name="Shape 187"/>
+          <p:cNvPr id="185" name="Shape 185"/>
           <p:cNvPicPr preferRelativeResize="0"/>
           <p:nvPr/>
         </p:nvPicPr>
@@ -7231,36 +7303,8 @@
         </p:blipFill>
         <p:spPr>
           <a:xfrm>
-            <a:off x="208100" y="4125774"/>
-            <a:ext cx="6753924" cy="727483"/>
-          </a:xfrm>
-          <a:prstGeom prst="rect">
-            <a:avLst/>
-          </a:prstGeom>
-          <a:noFill/>
-          <a:ln>
-            <a:noFill/>
-          </a:ln>
-        </p:spPr>
-      </p:pic>
-      <p:pic>
-        <p:nvPicPr>
-          <p:cNvPr id="188" name="Shape 188"/>
-          <p:cNvPicPr preferRelativeResize="0"/>
-          <p:nvPr/>
-        </p:nvPicPr>
-        <p:blipFill>
-          <a:blip r:embed="rId5">
-            <a:alphaModFix/>
-          </a:blip>
-          <a:stretch>
-            <a:fillRect/>
-          </a:stretch>
-        </p:blipFill>
-        <p:spPr>
-          <a:xfrm>
-            <a:off x="6962025" y="4703625"/>
-            <a:ext cx="2181974" cy="426550"/>
+            <a:off x="7483175" y="4703625"/>
+            <a:ext cx="1349125" cy="269825"/>
           </a:xfrm>
           <a:prstGeom prst="rect">
             <a:avLst/>
@@ -7284,7 +7328,7 @@
   <p:cSld>
     <p:spTree>
       <p:nvGrpSpPr>
-        <p:cNvPr id="192" name="Shape 192"/>
+        <p:cNvPr id="189" name="Shape 189"/>
         <p:cNvGrpSpPr/>
         <p:nvPr/>
       </p:nvGrpSpPr>
@@ -7298,7 +7342,7 @@
       </p:grpSpPr>
       <p:sp>
         <p:nvSpPr>
-          <p:cNvPr id="193" name="Shape 193"/>
+          <p:cNvPr id="190" name="Shape 190"/>
           <p:cNvSpPr txBox="1"/>
           <p:nvPr>
             <p:ph type="title"/>
@@ -7327,14 +7371,14 @@
             </a:pPr>
             <a:r>
               <a:rPr lang="en"/>
-              <a:t>PROVEAN &amp; SIFT</a:t>
+              <a:t>PolyPhen2</a:t>
             </a:r>
           </a:p>
         </p:txBody>
       </p:sp>
       <p:sp>
         <p:nvSpPr>
-          <p:cNvPr id="194" name="Shape 194"/>
+          <p:cNvPr id="191" name="Shape 191"/>
           <p:cNvSpPr txBox="1"/>
           <p:nvPr>
             <p:ph idx="1" type="body"/>
@@ -7370,7 +7414,7 @@
       </p:sp>
       <p:pic>
         <p:nvPicPr>
-          <p:cNvPr id="195" name="Shape 195"/>
+          <p:cNvPr id="192" name="Shape 192"/>
           <p:cNvPicPr preferRelativeResize="0"/>
           <p:nvPr/>
         </p:nvPicPr>
@@ -7384,8 +7428,64 @@
         </p:blipFill>
         <p:spPr>
           <a:xfrm>
-            <a:off x="1457325" y="1240300"/>
-            <a:ext cx="6229350" cy="3533775"/>
+            <a:off x="1763600" y="1171124"/>
+            <a:ext cx="5431450" cy="2801249"/>
+          </a:xfrm>
+          <a:prstGeom prst="rect">
+            <a:avLst/>
+          </a:prstGeom>
+          <a:noFill/>
+          <a:ln>
+            <a:noFill/>
+          </a:ln>
+        </p:spPr>
+      </p:pic>
+      <p:pic>
+        <p:nvPicPr>
+          <p:cNvPr id="193" name="Shape 193"/>
+          <p:cNvPicPr preferRelativeResize="0"/>
+          <p:nvPr/>
+        </p:nvPicPr>
+        <p:blipFill>
+          <a:blip r:embed="rId4">
+            <a:alphaModFix/>
+          </a:blip>
+          <a:stretch>
+            <a:fillRect/>
+          </a:stretch>
+        </p:blipFill>
+        <p:spPr>
+          <a:xfrm>
+            <a:off x="208100" y="4125774"/>
+            <a:ext cx="6753924" cy="727483"/>
+          </a:xfrm>
+          <a:prstGeom prst="rect">
+            <a:avLst/>
+          </a:prstGeom>
+          <a:noFill/>
+          <a:ln>
+            <a:noFill/>
+          </a:ln>
+        </p:spPr>
+      </p:pic>
+      <p:pic>
+        <p:nvPicPr>
+          <p:cNvPr id="194" name="Shape 194"/>
+          <p:cNvPicPr preferRelativeResize="0"/>
+          <p:nvPr/>
+        </p:nvPicPr>
+        <p:blipFill>
+          <a:blip r:embed="rId5">
+            <a:alphaModFix/>
+          </a:blip>
+          <a:stretch>
+            <a:fillRect/>
+          </a:stretch>
+        </p:blipFill>
+        <p:spPr>
+          <a:xfrm>
+            <a:off x="6962025" y="4703625"/>
+            <a:ext cx="2181974" cy="426550"/>
           </a:xfrm>
           <a:prstGeom prst="rect">
             <a:avLst/>
@@ -7624,7 +7724,7 @@
   <p:cSld>
     <p:spTree>
       <p:nvGrpSpPr>
-        <p:cNvPr id="199" name="Shape 199"/>
+        <p:cNvPr id="198" name="Shape 198"/>
         <p:cNvGrpSpPr/>
         <p:nvPr/>
       </p:nvGrpSpPr>
@@ -7638,7 +7738,7 @@
       </p:grpSpPr>
       <p:sp>
         <p:nvSpPr>
-          <p:cNvPr id="200" name="Shape 200"/>
+          <p:cNvPr id="199" name="Shape 199"/>
           <p:cNvSpPr txBox="1"/>
           <p:nvPr>
             <p:ph type="title"/>
@@ -7667,14 +7767,14 @@
             </a:pPr>
             <a:r>
               <a:rPr lang="en"/>
-              <a:t>Analyzing the Zimmer Genome</a:t>
+              <a:t>PROVEAN &amp; SIFT</a:t>
             </a:r>
           </a:p>
         </p:txBody>
       </p:sp>
       <p:sp>
         <p:nvSpPr>
-          <p:cNvPr id="201" name="Shape 201"/>
+          <p:cNvPr id="200" name="Shape 200"/>
           <p:cNvSpPr txBox="1"/>
           <p:nvPr>
             <p:ph idx="1" type="body"/>
@@ -7710,7 +7810,7 @@
       </p:sp>
       <p:pic>
         <p:nvPicPr>
-          <p:cNvPr id="202" name="Shape 202"/>
+          <p:cNvPr id="201" name="Shape 201"/>
           <p:cNvPicPr preferRelativeResize="0"/>
           <p:nvPr/>
         </p:nvPicPr>
@@ -7724,36 +7824,8 @@
         </p:blipFill>
         <p:spPr>
           <a:xfrm>
-            <a:off x="904073" y="1211097"/>
-            <a:ext cx="4510899" cy="3416400"/>
-          </a:xfrm>
-          <a:prstGeom prst="rect">
-            <a:avLst/>
-          </a:prstGeom>
-          <a:noFill/>
-          <a:ln>
-            <a:noFill/>
-          </a:ln>
-        </p:spPr>
-      </p:pic>
-      <p:pic>
-        <p:nvPicPr>
-          <p:cNvPr id="203" name="Shape 203"/>
-          <p:cNvPicPr preferRelativeResize="0"/>
-          <p:nvPr/>
-        </p:nvPicPr>
-        <p:blipFill>
-          <a:blip r:embed="rId4">
-            <a:alphaModFix/>
-          </a:blip>
-          <a:stretch>
-            <a:fillRect/>
-          </a:stretch>
-        </p:blipFill>
-        <p:spPr>
-          <a:xfrm>
-            <a:off x="4978287" y="2190750"/>
-            <a:ext cx="3419475" cy="762000"/>
+            <a:off x="1457325" y="1240300"/>
+            <a:ext cx="6229350" cy="3533775"/>
           </a:xfrm>
           <a:prstGeom prst="rect">
             <a:avLst/>
@@ -7777,7 +7849,7 @@
   <p:cSld>
     <p:spTree>
       <p:nvGrpSpPr>
-        <p:cNvPr id="207" name="Shape 207"/>
+        <p:cNvPr id="205" name="Shape 205"/>
         <p:cNvGrpSpPr/>
         <p:nvPr/>
       </p:nvGrpSpPr>
@@ -7791,7 +7863,7 @@
       </p:grpSpPr>
       <p:sp>
         <p:nvSpPr>
-          <p:cNvPr id="208" name="Shape 208"/>
+          <p:cNvPr id="206" name="Shape 206"/>
           <p:cNvSpPr txBox="1"/>
           <p:nvPr>
             <p:ph type="title"/>
@@ -7820,6 +7892,159 @@
             </a:pPr>
             <a:r>
               <a:rPr lang="en"/>
+              <a:t>Analyzing the Zimmer Genome</a:t>
+            </a:r>
+          </a:p>
+        </p:txBody>
+      </p:sp>
+      <p:sp>
+        <p:nvSpPr>
+          <p:cNvPr id="207" name="Shape 207"/>
+          <p:cNvSpPr txBox="1"/>
+          <p:nvPr>
+            <p:ph idx="1" type="body"/>
+          </p:nvPr>
+        </p:nvSpPr>
+        <p:spPr>
+          <a:xfrm>
+            <a:off x="311700" y="1152475"/>
+            <a:ext cx="8520600" cy="3416400"/>
+          </a:xfrm>
+          <a:prstGeom prst="rect">
+            <a:avLst/>
+          </a:prstGeom>
+        </p:spPr>
+        <p:txBody>
+          <a:bodyPr anchorCtr="0" anchor="t" bIns="91425" lIns="91425" rIns="91425" tIns="91425">
+            <a:noAutofit/>
+          </a:bodyPr>
+          <a:lstStyle/>
+          <a:p>
+            <a:pPr lvl="0">
+              <a:spcBef>
+                <a:spcPts val="0"/>
+              </a:spcBef>
+              <a:buNone/>
+            </a:pPr>
+            <a:r>
+              <a:t/>
+            </a:r>
+            <a:endParaRPr/>
+          </a:p>
+        </p:txBody>
+      </p:sp>
+      <p:pic>
+        <p:nvPicPr>
+          <p:cNvPr id="208" name="Shape 208"/>
+          <p:cNvPicPr preferRelativeResize="0"/>
+          <p:nvPr/>
+        </p:nvPicPr>
+        <p:blipFill>
+          <a:blip r:embed="rId3">
+            <a:alphaModFix/>
+          </a:blip>
+          <a:stretch>
+            <a:fillRect/>
+          </a:stretch>
+        </p:blipFill>
+        <p:spPr>
+          <a:xfrm>
+            <a:off x="904073" y="1211097"/>
+            <a:ext cx="4510899" cy="3416400"/>
+          </a:xfrm>
+          <a:prstGeom prst="rect">
+            <a:avLst/>
+          </a:prstGeom>
+          <a:noFill/>
+          <a:ln>
+            <a:noFill/>
+          </a:ln>
+        </p:spPr>
+      </p:pic>
+      <p:pic>
+        <p:nvPicPr>
+          <p:cNvPr id="209" name="Shape 209"/>
+          <p:cNvPicPr preferRelativeResize="0"/>
+          <p:nvPr/>
+        </p:nvPicPr>
+        <p:blipFill>
+          <a:blip r:embed="rId4">
+            <a:alphaModFix/>
+          </a:blip>
+          <a:stretch>
+            <a:fillRect/>
+          </a:stretch>
+        </p:blipFill>
+        <p:spPr>
+          <a:xfrm>
+            <a:off x="4978287" y="2190750"/>
+            <a:ext cx="3419475" cy="762000"/>
+          </a:xfrm>
+          <a:prstGeom prst="rect">
+            <a:avLst/>
+          </a:prstGeom>
+          <a:noFill/>
+          <a:ln>
+            <a:noFill/>
+          </a:ln>
+        </p:spPr>
+      </p:pic>
+    </p:spTree>
+  </p:cSld>
+  <p:clrMapOvr>
+    <a:masterClrMapping/>
+  </p:clrMapOvr>
+</p:sld>
+</file>
+
+<file path=ppt/slides/slide22.xml><?xml version="1.0" encoding="utf-8"?>
+<p:sld xmlns:a="http://schemas.openxmlformats.org/drawingml/2006/main" xmlns:r="http://schemas.openxmlformats.org/officeDocument/2006/relationships" xmlns:mc="http://schemas.openxmlformats.org/markup-compatibility/2006" xmlns:mv="urn:schemas-microsoft-com:mac:vml" xmlns:p="http://schemas.openxmlformats.org/presentationml/2006/main" xmlns:c="http://schemas.openxmlformats.org/drawingml/2006/chart" xmlns:dgm="http://schemas.openxmlformats.org/drawingml/2006/diagram" xmlns:o="urn:schemas-microsoft-com:office:office" xmlns:v="urn:schemas-microsoft-com:vml" xmlns:pvml="urn:schemas-microsoft-com:office:powerpoint" xmlns:com="http://schemas.openxmlformats.org/drawingml/2006/compatibility" xmlns:p14="http://schemas.microsoft.com/office/powerpoint/2010/main">
+  <p:cSld>
+    <p:spTree>
+      <p:nvGrpSpPr>
+        <p:cNvPr id="213" name="Shape 213"/>
+        <p:cNvGrpSpPr/>
+        <p:nvPr/>
+      </p:nvGrpSpPr>
+      <p:grpSpPr>
+        <a:xfrm>
+          <a:off x="0" y="0"/>
+          <a:ext cx="0" cy="0"/>
+          <a:chOff x="0" y="0"/>
+          <a:chExt cx="0" cy="0"/>
+        </a:xfrm>
+      </p:grpSpPr>
+      <p:sp>
+        <p:nvSpPr>
+          <p:cNvPr id="214" name="Shape 214"/>
+          <p:cNvSpPr txBox="1"/>
+          <p:nvPr>
+            <p:ph type="title"/>
+          </p:nvPr>
+        </p:nvSpPr>
+        <p:spPr>
+          <a:xfrm>
+            <a:off x="311700" y="445025"/>
+            <a:ext cx="8520600" cy="572700"/>
+          </a:xfrm>
+          <a:prstGeom prst="rect">
+            <a:avLst/>
+          </a:prstGeom>
+        </p:spPr>
+        <p:txBody>
+          <a:bodyPr anchorCtr="0" anchor="t" bIns="91425" lIns="91425" rIns="91425" tIns="91425">
+            <a:noAutofit/>
+          </a:bodyPr>
+          <a:lstStyle/>
+          <a:p>
+            <a:pPr lvl="0">
+              <a:spcBef>
+                <a:spcPts val="0"/>
+              </a:spcBef>
+              <a:buNone/>
+            </a:pPr>
+            <a:r>
+              <a:rPr lang="en"/>
               <a:t>Comparison of Various Programs</a:t>
             </a:r>
           </a:p>
@@ -7827,7 +8052,7 @@
       </p:sp>
       <p:graphicFrame>
         <p:nvGraphicFramePr>
-          <p:cNvPr id="209" name="Shape 209"/>
+          <p:cNvPr id="215" name="Shape 215"/>
           <p:cNvGraphicFramePr/>
           <p:nvPr/>
         </p:nvGraphicFramePr>
@@ -7840,7 +8065,7 @@
             <a:tbl>
               <a:tblPr>
                 <a:noFill/>
-                <a:tableStyleId>{2F79A820-E5A7-464E-AC72-1E38986ED0C9}</a:tableStyleId>
+                <a:tableStyleId>{E7551D87-942C-4309-B6BE-70F5FD54EF29}</a:tableStyleId>
               </a:tblPr>
               <a:tblGrid>
                 <a:gridCol w="1905000"/>
@@ -8573,7 +8798,7 @@
       </p:graphicFrame>
       <p:graphicFrame>
         <p:nvGraphicFramePr>
-          <p:cNvPr id="210" name="Shape 210"/>
+          <p:cNvPr id="216" name="Shape 216"/>
           <p:cNvGraphicFramePr/>
           <p:nvPr/>
         </p:nvGraphicFramePr>
@@ -8586,7 +8811,7 @@
             <a:tbl>
               <a:tblPr>
                 <a:noFill/>
-                <a:tableStyleId>{2F79A820-E5A7-464E-AC72-1E38986ED0C9}</a:tableStyleId>
+                <a:tableStyleId>{E7551D87-942C-4309-B6BE-70F5FD54EF29}</a:tableStyleId>
               </a:tblPr>
               <a:tblGrid>
                 <a:gridCol w="1800225"/>
@@ -9115,12 +9340,12 @@
 </p:sld>
 </file>
 
-<file path=ppt/slides/slide22.xml><?xml version="1.0" encoding="utf-8"?>
+<file path=ppt/slides/slide23.xml><?xml version="1.0" encoding="utf-8"?>
 <p:sld xmlns:a="http://schemas.openxmlformats.org/drawingml/2006/main" xmlns:r="http://schemas.openxmlformats.org/officeDocument/2006/relationships" xmlns:mc="http://schemas.openxmlformats.org/markup-compatibility/2006" xmlns:mv="urn:schemas-microsoft-com:mac:vml" xmlns:p="http://schemas.openxmlformats.org/presentationml/2006/main" xmlns:c="http://schemas.openxmlformats.org/drawingml/2006/chart" xmlns:dgm="http://schemas.openxmlformats.org/drawingml/2006/diagram" xmlns:o="urn:schemas-microsoft-com:office:office" xmlns:v="urn:schemas-microsoft-com:vml" xmlns:pvml="urn:schemas-microsoft-com:office:powerpoint" xmlns:com="http://schemas.openxmlformats.org/drawingml/2006/compatibility" xmlns:p14="http://schemas.microsoft.com/office/powerpoint/2010/main">
   <p:cSld>
     <p:spTree>
       <p:nvGrpSpPr>
-        <p:cNvPr id="214" name="Shape 214"/>
+        <p:cNvPr id="220" name="Shape 220"/>
         <p:cNvGrpSpPr/>
         <p:nvPr/>
       </p:nvGrpSpPr>
@@ -9134,7 +9359,7 @@
       </p:grpSpPr>
       <p:sp>
         <p:nvSpPr>
-          <p:cNvPr id="215" name="Shape 215"/>
+          <p:cNvPr id="221" name="Shape 221"/>
           <p:cNvSpPr txBox="1"/>
           <p:nvPr>
             <p:ph type="title"/>
@@ -9170,7 +9395,7 @@
       </p:sp>
       <p:sp>
         <p:nvSpPr>
-          <p:cNvPr id="216" name="Shape 216"/>
+          <p:cNvPr id="222" name="Shape 222"/>
           <p:cNvSpPr txBox="1"/>
           <p:nvPr>
             <p:ph idx="1" type="body"/>
@@ -9206,7 +9431,7 @@
       </p:sp>
       <p:pic>
         <p:nvPicPr>
-          <p:cNvPr id="217" name="Shape 217"/>
+          <p:cNvPr id="223" name="Shape 223"/>
           <p:cNvPicPr preferRelativeResize="0"/>
           <p:nvPr/>
         </p:nvPicPr>
@@ -9234,7 +9459,7 @@
       </p:pic>
       <p:pic>
         <p:nvPicPr>
-          <p:cNvPr id="218" name="Shape 218"/>
+          <p:cNvPr id="224" name="Shape 224"/>
           <p:cNvPicPr preferRelativeResize="0"/>
           <p:nvPr/>
         </p:nvPicPr>
@@ -9262,7 +9487,7 @@
       </p:pic>
       <p:pic>
         <p:nvPicPr>
-          <p:cNvPr id="219" name="Shape 219"/>
+          <p:cNvPr id="225" name="Shape 225"/>
           <p:cNvPicPr preferRelativeResize="0"/>
           <p:nvPr/>
         </p:nvPicPr>
@@ -9290,7 +9515,7 @@
       </p:pic>
       <p:pic>
         <p:nvPicPr>
-          <p:cNvPr id="220" name="Shape 220"/>
+          <p:cNvPr id="226" name="Shape 226"/>
           <p:cNvPicPr preferRelativeResize="0"/>
           <p:nvPr/>
         </p:nvPicPr>
@@ -9324,12 +9549,12 @@
 </p:sld>
 </file>
 
-<file path=ppt/slides/slide23.xml><?xml version="1.0" encoding="utf-8"?>
+<file path=ppt/slides/slide24.xml><?xml version="1.0" encoding="utf-8"?>
 <p:sld xmlns:a="http://schemas.openxmlformats.org/drawingml/2006/main" xmlns:r="http://schemas.openxmlformats.org/officeDocument/2006/relationships" xmlns:mc="http://schemas.openxmlformats.org/markup-compatibility/2006" xmlns:mv="urn:schemas-microsoft-com:mac:vml" xmlns:p="http://schemas.openxmlformats.org/presentationml/2006/main" xmlns:c="http://schemas.openxmlformats.org/drawingml/2006/chart" xmlns:dgm="http://schemas.openxmlformats.org/drawingml/2006/diagram" xmlns:o="urn:schemas-microsoft-com:office:office" xmlns:v="urn:schemas-microsoft-com:vml" xmlns:pvml="urn:schemas-microsoft-com:office:powerpoint" xmlns:com="http://schemas.openxmlformats.org/drawingml/2006/compatibility" xmlns:p14="http://schemas.microsoft.com/office/powerpoint/2010/main">
   <p:cSld>
     <p:spTree>
       <p:nvGrpSpPr>
-        <p:cNvPr id="224" name="Shape 224"/>
+        <p:cNvPr id="230" name="Shape 230"/>
         <p:cNvGrpSpPr/>
         <p:nvPr/>
       </p:nvGrpSpPr>
@@ -9343,7 +9568,7 @@
       </p:grpSpPr>
       <p:sp>
         <p:nvSpPr>
-          <p:cNvPr id="225" name="Shape 225"/>
+          <p:cNvPr id="231" name="Shape 231"/>
           <p:cNvSpPr txBox="1"/>
           <p:nvPr>
             <p:ph type="title"/>
@@ -9379,7 +9604,7 @@
       </p:sp>
       <p:sp>
         <p:nvSpPr>
-          <p:cNvPr id="226" name="Shape 226"/>
+          <p:cNvPr id="232" name="Shape 232"/>
           <p:cNvSpPr txBox="1"/>
           <p:nvPr>
             <p:ph idx="1" type="body"/>
@@ -9415,7 +9640,7 @@
       </p:sp>
       <p:pic>
         <p:nvPicPr>
-          <p:cNvPr id="227" name="Shape 227"/>
+          <p:cNvPr id="233" name="Shape 233"/>
           <p:cNvPicPr preferRelativeResize="0"/>
           <p:nvPr/>
         </p:nvPicPr>
@@ -9443,7 +9668,7 @@
       </p:pic>
       <p:pic>
         <p:nvPicPr>
-          <p:cNvPr id="228" name="Shape 228"/>
+          <p:cNvPr id="234" name="Shape 234"/>
           <p:cNvPicPr preferRelativeResize="0"/>
           <p:nvPr/>
         </p:nvPicPr>
@@ -10760,6 +10985,285 @@
 </file>
 
 <file path=ppt/theme/theme1.xml><?xml version="1.0" encoding="utf-8"?>
+<a:theme xmlns:a="http://schemas.openxmlformats.org/drawingml/2006/main" xmlns:r="http://schemas.openxmlformats.org/officeDocument/2006/relationships" name="Custom Theme">
+  <a:themeElements>
+    <a:clrScheme name="Default">
+      <a:dk1>
+        <a:srgbClr val="000000"/>
+      </a:dk1>
+      <a:lt1>
+        <a:srgbClr val="FFFFFF"/>
+      </a:lt1>
+      <a:dk2>
+        <a:srgbClr val="158158"/>
+      </a:dk2>
+      <a:lt2>
+        <a:srgbClr val="F3F3F3"/>
+      </a:lt2>
+      <a:accent1>
+        <a:srgbClr val="058DC7"/>
+      </a:accent1>
+      <a:accent2>
+        <a:srgbClr val="50B432"/>
+      </a:accent2>
+      <a:accent3>
+        <a:srgbClr val="ED561B"/>
+      </a:accent3>
+      <a:accent4>
+        <a:srgbClr val="EDEF00"/>
+      </a:accent4>
+      <a:accent5>
+        <a:srgbClr val="24CBE5"/>
+      </a:accent5>
+      <a:accent6>
+        <a:srgbClr val="64E572"/>
+      </a:accent6>
+      <a:hlink>
+        <a:srgbClr val="2200CC"/>
+      </a:hlink>
+      <a:folHlink>
+        <a:srgbClr val="551A8B"/>
+      </a:folHlink>
+    </a:clrScheme>
+    <a:fontScheme name="Office">
+      <a:majorFont>
+        <a:latin typeface="Arial"/>
+        <a:ea typeface=""/>
+        <a:cs typeface=""/>
+        <a:font script="Jpan" typeface="ＭＳ Ｐゴシック"/>
+        <a:font script="Hang" typeface="맑은 고딕"/>
+        <a:font script="Hans" typeface="宋体"/>
+        <a:font script="Hant" typeface="新細明體"/>
+        <a:font script="Arab" typeface="Times New Roman"/>
+        <a:font script="Hebr" typeface="Times New Roman"/>
+        <a:font script="Thai" typeface="Angsana New"/>
+        <a:font script="Ethi" typeface="Nyala"/>
+        <a:font script="Beng" typeface="Vrinda"/>
+        <a:font script="Gujr" typeface="Shruti"/>
+        <a:font script="Khmr" typeface="MoolBoran"/>
+        <a:font script="Knda" typeface="Tunga"/>
+        <a:font script="Guru" typeface="Raavi"/>
+        <a:font script="Cans" typeface="Euphemia"/>
+        <a:font script="Cher" typeface="Plantagenet Cherokee"/>
+        <a:font script="Yiii" typeface="Microsoft Yi Baiti"/>
+        <a:font script="Tibt" typeface="Microsoft Himalaya"/>
+        <a:font script="Thaa" typeface="MV Boli"/>
+        <a:font script="Deva" typeface="Mangal"/>
+        <a:font script="Telu" typeface="Gautami"/>
+        <a:font script="Taml" typeface="Latha"/>
+        <a:font script="Syrc" typeface="Estrangelo Edessa"/>
+        <a:font script="Orya" typeface="Kalinga"/>
+        <a:font script="Mlym" typeface="Kartika"/>
+        <a:font script="Laoo" typeface="DokChampa"/>
+        <a:font script="Sinh" typeface="Iskoola Pota"/>
+        <a:font script="Mong" typeface="Mongolian Baiti"/>
+        <a:font script="Viet" typeface="Times New Roman"/>
+        <a:font script="Uigh" typeface="Microsoft Uighur"/>
+        <a:font script="Geor" typeface="Sylfaen"/>
+      </a:majorFont>
+      <a:minorFont>
+        <a:latin typeface="Arial"/>
+        <a:ea typeface=""/>
+        <a:cs typeface=""/>
+        <a:font script="Jpan" typeface="ＭＳ Ｐゴシック"/>
+        <a:font script="Hang" typeface="맑은 고딕"/>
+        <a:font script="Hans" typeface="宋体"/>
+        <a:font script="Hant" typeface="新細明體"/>
+        <a:font script="Arab" typeface="Arial"/>
+        <a:font script="Hebr" typeface="Arial"/>
+        <a:font script="Thai" typeface="Cordia New"/>
+        <a:font script="Ethi" typeface="Nyala"/>
+        <a:font script="Beng" typeface="Vrinda"/>
+        <a:font script="Gujr" typeface="Shruti"/>
+        <a:font script="Khmr" typeface="DaunPenh"/>
+        <a:font script="Knda" typeface="Tunga"/>
+        <a:font script="Guru" typeface="Raavi"/>
+        <a:font script="Cans" typeface="Euphemia"/>
+        <a:font script="Cher" typeface="Plantagenet Cherokee"/>
+        <a:font script="Yiii" typeface="Microsoft Yi Baiti"/>
+        <a:font script="Tibt" typeface="Microsoft Himalaya"/>
+        <a:font script="Thaa" typeface="MV Boli"/>
+        <a:font script="Deva" typeface="Mangal"/>
+        <a:font script="Telu" typeface="Gautami"/>
+        <a:font script="Taml" typeface="Latha"/>
+        <a:font script="Syrc" typeface="Estrangelo Edessa"/>
+        <a:font script="Orya" typeface="Kalinga"/>
+        <a:font script="Mlym" typeface="Kartika"/>
+        <a:font script="Laoo" typeface="DokChampa"/>
+        <a:font script="Sinh" typeface="Iskoola Pota"/>
+        <a:font script="Mong" typeface="Mongolian Baiti"/>
+        <a:font script="Viet" typeface="Arial"/>
+        <a:font script="Uigh" typeface="Microsoft Uighur"/>
+        <a:font script="Geor" typeface="Sylfaen"/>
+      </a:minorFont>
+    </a:fontScheme>
+    <a:fmtScheme name="Office">
+      <a:fillStyleLst>
+        <a:solidFill>
+          <a:schemeClr val="phClr"/>
+        </a:solidFill>
+        <a:gradFill rotWithShape="1">
+          <a:gsLst>
+            <a:gs pos="0">
+              <a:schemeClr val="phClr">
+                <a:tint val="50000"/>
+                <a:satMod val="300000"/>
+              </a:schemeClr>
+            </a:gs>
+            <a:gs pos="35000">
+              <a:schemeClr val="phClr">
+                <a:tint val="37000"/>
+                <a:satMod val="300000"/>
+              </a:schemeClr>
+            </a:gs>
+            <a:gs pos="100000">
+              <a:schemeClr val="phClr">
+                <a:tint val="15000"/>
+                <a:satMod val="350000"/>
+              </a:schemeClr>
+            </a:gs>
+          </a:gsLst>
+          <a:lin ang="16200000" scaled="1"/>
+        </a:gradFill>
+        <a:gradFill rotWithShape="1">
+          <a:gsLst>
+            <a:gs pos="0">
+              <a:schemeClr val="phClr">
+                <a:tint val="100000"/>
+                <a:shade val="100000"/>
+                <a:satMod val="130000"/>
+              </a:schemeClr>
+            </a:gs>
+            <a:gs pos="100000">
+              <a:schemeClr val="phClr">
+                <a:tint val="50000"/>
+                <a:shade val="100000"/>
+                <a:satMod val="350000"/>
+              </a:schemeClr>
+            </a:gs>
+          </a:gsLst>
+          <a:lin ang="16200000" scaled="0"/>
+        </a:gradFill>
+      </a:fillStyleLst>
+      <a:lnStyleLst>
+        <a:ln w="9525" cap="flat" cmpd="sng" algn="ctr">
+          <a:solidFill>
+            <a:schemeClr val="phClr">
+              <a:shade val="95000"/>
+              <a:satMod val="105000"/>
+            </a:schemeClr>
+          </a:solidFill>
+          <a:prstDash val="solid"/>
+        </a:ln>
+        <a:ln w="25400" cap="flat" cmpd="sng" algn="ctr">
+          <a:solidFill>
+            <a:schemeClr val="phClr"/>
+          </a:solidFill>
+          <a:prstDash val="solid"/>
+        </a:ln>
+        <a:ln w="38100" cap="flat" cmpd="sng" algn="ctr">
+          <a:solidFill>
+            <a:schemeClr val="phClr"/>
+          </a:solidFill>
+          <a:prstDash val="solid"/>
+        </a:ln>
+      </a:lnStyleLst>
+      <a:effectStyleLst>
+        <a:effectStyle>
+          <a:effectLst>
+            <a:outerShdw blurRad="40000" dist="20000" dir="5400000" rotWithShape="0">
+              <a:srgbClr val="000000">
+                <a:alpha val="38000"/>
+              </a:srgbClr>
+            </a:outerShdw>
+          </a:effectLst>
+        </a:effectStyle>
+        <a:effectStyle>
+          <a:effectLst>
+            <a:outerShdw blurRad="40000" dist="23000" dir="5400000" rotWithShape="0">
+              <a:srgbClr val="000000">
+                <a:alpha val="35000"/>
+              </a:srgbClr>
+            </a:outerShdw>
+          </a:effectLst>
+        </a:effectStyle>
+        <a:effectStyle>
+          <a:effectLst>
+            <a:outerShdw blurRad="40000" dist="23000" dir="5400000" rotWithShape="0">
+              <a:srgbClr val="000000">
+                <a:alpha val="35000"/>
+              </a:srgbClr>
+            </a:outerShdw>
+          </a:effectLst>
+          <a:scene3d>
+            <a:camera prst="orthographicFront">
+              <a:rot lat="0" lon="0" rev="0"/>
+            </a:camera>
+            <a:lightRig rig="threePt" dir="t">
+              <a:rot lat="0" lon="0" rev="1200000"/>
+            </a:lightRig>
+          </a:scene3d>
+          <a:sp3d>
+            <a:bevelT w="63500" h="25400"/>
+          </a:sp3d>
+        </a:effectStyle>
+      </a:effectStyleLst>
+      <a:bgFillStyleLst>
+        <a:solidFill>
+          <a:schemeClr val="phClr"/>
+        </a:solidFill>
+        <a:gradFill rotWithShape="1">
+          <a:gsLst>
+            <a:gs pos="0">
+              <a:schemeClr val="phClr">
+                <a:tint val="40000"/>
+                <a:satMod val="350000"/>
+              </a:schemeClr>
+            </a:gs>
+            <a:gs pos="40000">
+              <a:schemeClr val="phClr">
+                <a:tint val="45000"/>
+                <a:shade val="99000"/>
+                <a:satMod val="350000"/>
+              </a:schemeClr>
+            </a:gs>
+            <a:gs pos="100000">
+              <a:schemeClr val="phClr">
+                <a:shade val="20000"/>
+                <a:satMod val="255000"/>
+              </a:schemeClr>
+            </a:gs>
+          </a:gsLst>
+          <a:path path="circle">
+            <a:fillToRect l="50000" t="-80000" r="50000" b="180000"/>
+          </a:path>
+        </a:gradFill>
+        <a:gradFill rotWithShape="1">
+          <a:gsLst>
+            <a:gs pos="0">
+              <a:schemeClr val="phClr">
+                <a:tint val="80000"/>
+                <a:satMod val="300000"/>
+              </a:schemeClr>
+            </a:gs>
+            <a:gs pos="100000">
+              <a:schemeClr val="phClr">
+                <a:shade val="30000"/>
+                <a:satMod val="200000"/>
+              </a:schemeClr>
+            </a:gs>
+          </a:gsLst>
+          <a:path path="circle">
+            <a:fillToRect l="50000" t="50000" r="50000" b="50000"/>
+          </a:path>
+        </a:gradFill>
+      </a:bgFillStyleLst>
+    </a:fmtScheme>
+  </a:themeElements>
+</a:theme>
+</file>
+
+<file path=ppt/theme/theme2.xml><?xml version="1.0" encoding="utf-8"?>
 <a:theme xmlns:a="http://schemas.openxmlformats.org/drawingml/2006/main" xmlns:r="http://schemas.openxmlformats.org/officeDocument/2006/relationships" name="simple-light-2">
   <a:themeElements>
     <a:clrScheme name="Simple Light">
@@ -11036,283 +11540,4 @@
     </a:fmtScheme>
   </a:themeElements>
 </a:theme>
-</file>
-
-<file path=ppt/theme/theme2.xml><?xml version="1.0" encoding="utf-8"?>
-<a:theme xmlns:a="http://schemas.openxmlformats.org/drawingml/2006/main" xmlns:r="http://schemas.openxmlformats.org/officeDocument/2006/relationships" name="Custom Theme">
-  <a:themeElements>
-    <a:clrScheme name="Default">
-      <a:dk1>
-        <a:srgbClr val="000000"/>
-      </a:dk1>
-      <a:lt1>
-        <a:srgbClr val="FFFFFF"/>
-      </a:lt1>
-      <a:dk2>
-        <a:srgbClr val="158158"/>
-      </a:dk2>
-      <a:lt2>
-        <a:srgbClr val="F3F3F3"/>
-      </a:lt2>
-      <a:accent1>
-        <a:srgbClr val="058DC7"/>
-      </a:accent1>
-      <a:accent2>
-        <a:srgbClr val="50B432"/>
-      </a:accent2>
-      <a:accent3>
-        <a:srgbClr val="ED561B"/>
-      </a:accent3>
-      <a:accent4>
-        <a:srgbClr val="EDEF00"/>
-      </a:accent4>
-      <a:accent5>
-        <a:srgbClr val="24CBE5"/>
-      </a:accent5>
-      <a:accent6>
-        <a:srgbClr val="64E572"/>
-      </a:accent6>
-      <a:hlink>
-        <a:srgbClr val="2200CC"/>
-      </a:hlink>
-      <a:folHlink>
-        <a:srgbClr val="551A8B"/>
-      </a:folHlink>
-    </a:clrScheme>
-    <a:fontScheme name="Office">
-      <a:majorFont>
-        <a:latin typeface="Arial"/>
-        <a:ea typeface=""/>
-        <a:cs typeface=""/>
-        <a:font script="Jpan" typeface="ＭＳ Ｐゴシック"/>
-        <a:font script="Hang" typeface="맑은 고딕"/>
-        <a:font script="Hans" typeface="宋体"/>
-        <a:font script="Hant" typeface="新細明體"/>
-        <a:font script="Arab" typeface="Times New Roman"/>
-        <a:font script="Hebr" typeface="Times New Roman"/>
-        <a:font script="Thai" typeface="Angsana New"/>
-        <a:font script="Ethi" typeface="Nyala"/>
-        <a:font script="Beng" typeface="Vrinda"/>
-        <a:font script="Gujr" typeface="Shruti"/>
-        <a:font script="Khmr" typeface="MoolBoran"/>
-        <a:font script="Knda" typeface="Tunga"/>
-        <a:font script="Guru" typeface="Raavi"/>
-        <a:font script="Cans" typeface="Euphemia"/>
-        <a:font script="Cher" typeface="Plantagenet Cherokee"/>
-        <a:font script="Yiii" typeface="Microsoft Yi Baiti"/>
-        <a:font script="Tibt" typeface="Microsoft Himalaya"/>
-        <a:font script="Thaa" typeface="MV Boli"/>
-        <a:font script="Deva" typeface="Mangal"/>
-        <a:font script="Telu" typeface="Gautami"/>
-        <a:font script="Taml" typeface="Latha"/>
-        <a:font script="Syrc" typeface="Estrangelo Edessa"/>
-        <a:font script="Orya" typeface="Kalinga"/>
-        <a:font script="Mlym" typeface="Kartika"/>
-        <a:font script="Laoo" typeface="DokChampa"/>
-        <a:font script="Sinh" typeface="Iskoola Pota"/>
-        <a:font script="Mong" typeface="Mongolian Baiti"/>
-        <a:font script="Viet" typeface="Times New Roman"/>
-        <a:font script="Uigh" typeface="Microsoft Uighur"/>
-        <a:font script="Geor" typeface="Sylfaen"/>
-      </a:majorFont>
-      <a:minorFont>
-        <a:latin typeface="Arial"/>
-        <a:ea typeface=""/>
-        <a:cs typeface=""/>
-        <a:font script="Jpan" typeface="ＭＳ Ｐゴシック"/>
-        <a:font script="Hang" typeface="맑은 고딕"/>
-        <a:font script="Hans" typeface="宋体"/>
-        <a:font script="Hant" typeface="新細明體"/>
-        <a:font script="Arab" typeface="Arial"/>
-        <a:font script="Hebr" typeface="Arial"/>
-        <a:font script="Thai" typeface="Cordia New"/>
-        <a:font script="Ethi" typeface="Nyala"/>
-        <a:font script="Beng" typeface="Vrinda"/>
-        <a:font script="Gujr" typeface="Shruti"/>
-        <a:font script="Khmr" typeface="DaunPenh"/>
-        <a:font script="Knda" typeface="Tunga"/>
-        <a:font script="Guru" typeface="Raavi"/>
-        <a:font script="Cans" typeface="Euphemia"/>
-        <a:font script="Cher" typeface="Plantagenet Cherokee"/>
-        <a:font script="Yiii" typeface="Microsoft Yi Baiti"/>
-        <a:font script="Tibt" typeface="Microsoft Himalaya"/>
-        <a:font script="Thaa" typeface="MV Boli"/>
-        <a:font script="Deva" typeface="Mangal"/>
-        <a:font script="Telu" typeface="Gautami"/>
-        <a:font script="Taml" typeface="Latha"/>
-        <a:font script="Syrc" typeface="Estrangelo Edessa"/>
-        <a:font script="Orya" typeface="Kalinga"/>
-        <a:font script="Mlym" typeface="Kartika"/>
-        <a:font script="Laoo" typeface="DokChampa"/>
-        <a:font script="Sinh" typeface="Iskoola Pota"/>
-        <a:font script="Mong" typeface="Mongolian Baiti"/>
-        <a:font script="Viet" typeface="Arial"/>
-        <a:font script="Uigh" typeface="Microsoft Uighur"/>
-        <a:font script="Geor" typeface="Sylfaen"/>
-      </a:minorFont>
-    </a:fontScheme>
-    <a:fmtScheme name="Office">
-      <a:fillStyleLst>
-        <a:solidFill>
-          <a:schemeClr val="phClr"/>
-        </a:solidFill>
-        <a:gradFill rotWithShape="1">
-          <a:gsLst>
-            <a:gs pos="0">
-              <a:schemeClr val="phClr">
-                <a:tint val="50000"/>
-                <a:satMod val="300000"/>
-              </a:schemeClr>
-            </a:gs>
-            <a:gs pos="35000">
-              <a:schemeClr val="phClr">
-                <a:tint val="37000"/>
-                <a:satMod val="300000"/>
-              </a:schemeClr>
-            </a:gs>
-            <a:gs pos="100000">
-              <a:schemeClr val="phClr">
-                <a:tint val="15000"/>
-                <a:satMod val="350000"/>
-              </a:schemeClr>
-            </a:gs>
-          </a:gsLst>
-          <a:lin ang="16200000" scaled="1"/>
-        </a:gradFill>
-        <a:gradFill rotWithShape="1">
-          <a:gsLst>
-            <a:gs pos="0">
-              <a:schemeClr val="phClr">
-                <a:tint val="100000"/>
-                <a:shade val="100000"/>
-                <a:satMod val="130000"/>
-              </a:schemeClr>
-            </a:gs>
-            <a:gs pos="100000">
-              <a:schemeClr val="phClr">
-                <a:tint val="50000"/>
-                <a:shade val="100000"/>
-                <a:satMod val="350000"/>
-              </a:schemeClr>
-            </a:gs>
-          </a:gsLst>
-          <a:lin ang="16200000" scaled="0"/>
-        </a:gradFill>
-      </a:fillStyleLst>
-      <a:lnStyleLst>
-        <a:ln w="9525" cap="flat" cmpd="sng" algn="ctr">
-          <a:solidFill>
-            <a:schemeClr val="phClr">
-              <a:shade val="95000"/>
-              <a:satMod val="105000"/>
-            </a:schemeClr>
-          </a:solidFill>
-          <a:prstDash val="solid"/>
-        </a:ln>
-        <a:ln w="25400" cap="flat" cmpd="sng" algn="ctr">
-          <a:solidFill>
-            <a:schemeClr val="phClr"/>
-          </a:solidFill>
-          <a:prstDash val="solid"/>
-        </a:ln>
-        <a:ln w="38100" cap="flat" cmpd="sng" algn="ctr">
-          <a:solidFill>
-            <a:schemeClr val="phClr"/>
-          </a:solidFill>
-          <a:prstDash val="solid"/>
-        </a:ln>
-      </a:lnStyleLst>
-      <a:effectStyleLst>
-        <a:effectStyle>
-          <a:effectLst>
-            <a:outerShdw blurRad="40000" dist="20000" dir="5400000" rotWithShape="0">
-              <a:srgbClr val="000000">
-                <a:alpha val="38000"/>
-              </a:srgbClr>
-            </a:outerShdw>
-          </a:effectLst>
-        </a:effectStyle>
-        <a:effectStyle>
-          <a:effectLst>
-            <a:outerShdw blurRad="40000" dist="23000" dir="5400000" rotWithShape="0">
-              <a:srgbClr val="000000">
-                <a:alpha val="35000"/>
-              </a:srgbClr>
-            </a:outerShdw>
-          </a:effectLst>
-        </a:effectStyle>
-        <a:effectStyle>
-          <a:effectLst>
-            <a:outerShdw blurRad="40000" dist="23000" dir="5400000" rotWithShape="0">
-              <a:srgbClr val="000000">
-                <a:alpha val="35000"/>
-              </a:srgbClr>
-            </a:outerShdw>
-          </a:effectLst>
-          <a:scene3d>
-            <a:camera prst="orthographicFront">
-              <a:rot lat="0" lon="0" rev="0"/>
-            </a:camera>
-            <a:lightRig rig="threePt" dir="t">
-              <a:rot lat="0" lon="0" rev="1200000"/>
-            </a:lightRig>
-          </a:scene3d>
-          <a:sp3d>
-            <a:bevelT w="63500" h="25400"/>
-          </a:sp3d>
-        </a:effectStyle>
-      </a:effectStyleLst>
-      <a:bgFillStyleLst>
-        <a:solidFill>
-          <a:schemeClr val="phClr"/>
-        </a:solidFill>
-        <a:gradFill rotWithShape="1">
-          <a:gsLst>
-            <a:gs pos="0">
-              <a:schemeClr val="phClr">
-                <a:tint val="40000"/>
-                <a:satMod val="350000"/>
-              </a:schemeClr>
-            </a:gs>
-            <a:gs pos="40000">
-              <a:schemeClr val="phClr">
-                <a:tint val="45000"/>
-                <a:shade val="99000"/>
-                <a:satMod val="350000"/>
-              </a:schemeClr>
-            </a:gs>
-            <a:gs pos="100000">
-              <a:schemeClr val="phClr">
-                <a:shade val="20000"/>
-                <a:satMod val="255000"/>
-              </a:schemeClr>
-            </a:gs>
-          </a:gsLst>
-          <a:path path="circle">
-            <a:fillToRect l="50000" t="-80000" r="50000" b="180000"/>
-          </a:path>
-        </a:gradFill>
-        <a:gradFill rotWithShape="1">
-          <a:gsLst>
-            <a:gs pos="0">
-              <a:schemeClr val="phClr">
-                <a:tint val="80000"/>
-                <a:satMod val="300000"/>
-              </a:schemeClr>
-            </a:gs>
-            <a:gs pos="100000">
-              <a:schemeClr val="phClr">
-                <a:shade val="30000"/>
-                <a:satMod val="200000"/>
-              </a:schemeClr>
-            </a:gs>
-          </a:gsLst>
-          <a:path path="circle">
-            <a:fillToRect l="50000" t="50000" r="50000" b="50000"/>
-          </a:path>
-        </a:gradFill>
-      </a:bgFillStyleLst>
-    </a:fmtScheme>
-  </a:themeElements>
-</a:theme>
 </file>
</xml_diff>